<commit_message>
Placed Non-functional requirements at beginning
</commit_message>
<xml_diff>
--- a/My EZ Shopper.pptx
+++ b/My EZ Shopper.pptx
@@ -6,31 +6,31 @@
   </p:sldMasterIdLst>
   <p:sldIdLst>
     <p:sldId id="256" r:id="rId2"/>
-    <p:sldId id="257" r:id="rId3"/>
-    <p:sldId id="264" r:id="rId4"/>
-    <p:sldId id="265" r:id="rId5"/>
-    <p:sldId id="278" r:id="rId6"/>
-    <p:sldId id="279" r:id="rId7"/>
-    <p:sldId id="280" r:id="rId8"/>
-    <p:sldId id="281" r:id="rId9"/>
-    <p:sldId id="258" r:id="rId10"/>
-    <p:sldId id="266" r:id="rId11"/>
-    <p:sldId id="259" r:id="rId12"/>
-    <p:sldId id="267" r:id="rId13"/>
-    <p:sldId id="268" r:id="rId14"/>
-    <p:sldId id="273" r:id="rId15"/>
-    <p:sldId id="274" r:id="rId16"/>
-    <p:sldId id="275" r:id="rId17"/>
-    <p:sldId id="260" r:id="rId18"/>
-    <p:sldId id="269" r:id="rId19"/>
-    <p:sldId id="270" r:id="rId20"/>
-    <p:sldId id="271" r:id="rId21"/>
-    <p:sldId id="272" r:id="rId22"/>
-    <p:sldId id="261" r:id="rId23"/>
-    <p:sldId id="276" r:id="rId24"/>
-    <p:sldId id="277" r:id="rId25"/>
-    <p:sldId id="262" r:id="rId26"/>
-    <p:sldId id="263" r:id="rId27"/>
+    <p:sldId id="283" r:id="rId3"/>
+    <p:sldId id="284" r:id="rId4"/>
+    <p:sldId id="257" r:id="rId5"/>
+    <p:sldId id="264" r:id="rId6"/>
+    <p:sldId id="265" r:id="rId7"/>
+    <p:sldId id="278" r:id="rId8"/>
+    <p:sldId id="279" r:id="rId9"/>
+    <p:sldId id="280" r:id="rId10"/>
+    <p:sldId id="281" r:id="rId11"/>
+    <p:sldId id="258" r:id="rId12"/>
+    <p:sldId id="266" r:id="rId13"/>
+    <p:sldId id="259" r:id="rId14"/>
+    <p:sldId id="267" r:id="rId15"/>
+    <p:sldId id="268" r:id="rId16"/>
+    <p:sldId id="273" r:id="rId17"/>
+    <p:sldId id="274" r:id="rId18"/>
+    <p:sldId id="275" r:id="rId19"/>
+    <p:sldId id="260" r:id="rId20"/>
+    <p:sldId id="269" r:id="rId21"/>
+    <p:sldId id="270" r:id="rId22"/>
+    <p:sldId id="271" r:id="rId23"/>
+    <p:sldId id="272" r:id="rId24"/>
+    <p:sldId id="261" r:id="rId25"/>
+    <p:sldId id="276" r:id="rId26"/>
+    <p:sldId id="277" r:id="rId27"/>
     <p:sldId id="282" r:id="rId28"/>
   </p:sldIdLst>
   <p:sldSz cx="12192000" cy="6858000"/>
@@ -5913,7 +5913,7 @@
           <a:p>
             <a:r>
               <a:rPr lang="en-US" dirty="0" smtClean="0"/>
-              <a:t>API Deals—Client Side Implementation</a:t>
+              <a:t>Shopping List, Remove—Server Side Implementation</a:t>
             </a:r>
             <a:endParaRPr lang="en-US" dirty="0"/>
           </a:p>
@@ -5941,7 +5941,7 @@
     </p:spTree>
     <p:extLst>
       <p:ext uri="{BB962C8B-B14F-4D97-AF65-F5344CB8AC3E}">
-        <p14:creationId xmlns:p14="http://schemas.microsoft.com/office/powerpoint/2010/main" val="2221208027"/>
+        <p14:creationId xmlns:p14="http://schemas.microsoft.com/office/powerpoint/2010/main" val="1923779810"/>
       </p:ext>
     </p:extLst>
   </p:cSld>
@@ -5985,7 +5985,7 @@
           <a:p>
             <a:r>
               <a:rPr lang="en-US" dirty="0" smtClean="0"/>
-              <a:t>Functional Requirement—User Deals</a:t>
+              <a:t>Functional Requirement—API Deals</a:t>
             </a:r>
             <a:endParaRPr lang="en-US" dirty="0"/>
           </a:p>
@@ -6008,47 +6008,12 @@
           <a:p>
             <a:r>
               <a:rPr lang="en-US" dirty="0"/>
-              <a:t>3. Users will be able to add an item that is available for sale to the system.  </a:t>
+              <a:t>2. Users will be able to search for sale prices at supported stores for an item in their shopping list. </a:t>
             </a:r>
             <a:r>
               <a:rPr lang="en-US" i="1" dirty="0"/>
-              <a:t>(This allows users to add items that are not located by Requirement 2</a:t>
-            </a:r>
-            <a:r>
-              <a:rPr lang="en-US" i="1" dirty="0" smtClean="0"/>
-              <a:t>.)</a:t>
-            </a:r>
-          </a:p>
-          <a:p>
-            <a:r>
-              <a:rPr lang="en-US" dirty="0" smtClean="0"/>
-              <a:t>4. Users </a:t>
-            </a:r>
-            <a:r>
-              <a:rPr lang="en-US" dirty="0"/>
-              <a:t>will be able to validate whether an item is available at a sales price. </a:t>
-            </a:r>
-            <a:r>
-              <a:rPr lang="en-US" i="1" dirty="0"/>
-              <a:t>(This allows users to determine whether an item is still available</a:t>
-            </a:r>
-            <a:r>
-              <a:rPr lang="en-US" i="1" dirty="0" smtClean="0"/>
-              <a:t>.)</a:t>
-            </a:r>
-          </a:p>
-          <a:p>
-            <a:r>
-              <a:rPr lang="en-US" dirty="0"/>
-              <a:t>5. Expired user-created deals will not appear in search results.  </a:t>
-            </a:r>
-            <a:r>
-              <a:rPr lang="en-US" i="1" dirty="0"/>
-              <a:t>(This feature is necessary for ensuring that only valid deals appear.)</a:t>
-            </a:r>
-            <a:endParaRPr lang="en-US" dirty="0"/>
-          </a:p>
-          <a:p>
+              <a:t>(This will allow users to find prices for an item of interest.)</a:t>
+            </a:r>
             <a:endParaRPr lang="en-US" dirty="0"/>
           </a:p>
         </p:txBody>
@@ -6056,7 +6021,7 @@
     </p:spTree>
     <p:extLst>
       <p:ext uri="{BB962C8B-B14F-4D97-AF65-F5344CB8AC3E}">
-        <p14:creationId xmlns:p14="http://schemas.microsoft.com/office/powerpoint/2010/main" val="3002737573"/>
+        <p14:creationId xmlns:p14="http://schemas.microsoft.com/office/powerpoint/2010/main" val="3396351313"/>
       </p:ext>
     </p:extLst>
   </p:cSld>
@@ -6100,7 +6065,7 @@
           <a:p>
             <a:r>
               <a:rPr lang="en-US" dirty="0" smtClean="0"/>
-              <a:t>User Deals, Add—Client Side Implementation</a:t>
+              <a:t>API Deals—Client Side Implementation</a:t>
             </a:r>
             <a:endParaRPr lang="en-US" dirty="0"/>
           </a:p>
@@ -6128,7 +6093,7 @@
     </p:spTree>
     <p:extLst>
       <p:ext uri="{BB962C8B-B14F-4D97-AF65-F5344CB8AC3E}">
-        <p14:creationId xmlns:p14="http://schemas.microsoft.com/office/powerpoint/2010/main" val="449716672"/>
+        <p14:creationId xmlns:p14="http://schemas.microsoft.com/office/powerpoint/2010/main" val="2221208027"/>
       </p:ext>
     </p:extLst>
   </p:cSld>
@@ -6172,7 +6137,7 @@
           <a:p>
             <a:r>
               <a:rPr lang="en-US" dirty="0" smtClean="0"/>
-              <a:t>User Deals, Add—Server Side Implementation</a:t>
+              <a:t>Functional Requirement—User Deals</a:t>
             </a:r>
             <a:endParaRPr lang="en-US" dirty="0"/>
           </a:p>
@@ -6193,14 +6158,57 @@
           <a:bodyPr/>
           <a:lstStyle/>
           <a:p>
-            <a:endParaRPr lang="en-US"/>
+            <a:r>
+              <a:rPr lang="en-US" dirty="0"/>
+              <a:t>3. Users will be able to add an item that is available for sale to the system.  </a:t>
+            </a:r>
+            <a:r>
+              <a:rPr lang="en-US" i="1" dirty="0"/>
+              <a:t>(This allows users to add items that are not located by Requirement 2</a:t>
+            </a:r>
+            <a:r>
+              <a:rPr lang="en-US" i="1" dirty="0" smtClean="0"/>
+              <a:t>.)</a:t>
+            </a:r>
+          </a:p>
+          <a:p>
+            <a:r>
+              <a:rPr lang="en-US" dirty="0" smtClean="0"/>
+              <a:t>4. Users </a:t>
+            </a:r>
+            <a:r>
+              <a:rPr lang="en-US" dirty="0"/>
+              <a:t>will be able to validate whether an item is available at a sales price. </a:t>
+            </a:r>
+            <a:r>
+              <a:rPr lang="en-US" i="1" dirty="0"/>
+              <a:t>(This allows users to determine whether an item is still available</a:t>
+            </a:r>
+            <a:r>
+              <a:rPr lang="en-US" i="1" dirty="0" smtClean="0"/>
+              <a:t>.)</a:t>
+            </a:r>
+          </a:p>
+          <a:p>
+            <a:r>
+              <a:rPr lang="en-US" dirty="0"/>
+              <a:t>5. Expired user-created deals will not appear in search results.  </a:t>
+            </a:r>
+            <a:r>
+              <a:rPr lang="en-US" i="1" dirty="0"/>
+              <a:t>(This feature is necessary for ensuring that only valid deals appear.)</a:t>
+            </a:r>
+            <a:endParaRPr lang="en-US" dirty="0"/>
+          </a:p>
+          <a:p>
+            <a:endParaRPr lang="en-US" dirty="0"/>
           </a:p>
         </p:txBody>
       </p:sp>
     </p:spTree>
     <p:extLst>
       <p:ext uri="{BB962C8B-B14F-4D97-AF65-F5344CB8AC3E}">
-        <p14:creationId xmlns:p14="http://schemas.microsoft.com/office/powerpoint/2010/main" val="100306373"/>
+        <p14:creationId xmlns:p14="http://schemas.microsoft.com/office/powerpoint/2010/main" val="3002737573"/>
       </p:ext>
     </p:extLst>
   </p:cSld>
@@ -6244,7 +6252,7 @@
           <a:p>
             <a:r>
               <a:rPr lang="en-US" dirty="0" smtClean="0"/>
-              <a:t>User Deals, Validate—Client Side Implementation</a:t>
+              <a:t>User Deals, Add—Client Side Implementation</a:t>
             </a:r>
             <a:endParaRPr lang="en-US" dirty="0"/>
           </a:p>
@@ -6272,7 +6280,7 @@
     </p:spTree>
     <p:extLst>
       <p:ext uri="{BB962C8B-B14F-4D97-AF65-F5344CB8AC3E}">
-        <p14:creationId xmlns:p14="http://schemas.microsoft.com/office/powerpoint/2010/main" val="2954434646"/>
+        <p14:creationId xmlns:p14="http://schemas.microsoft.com/office/powerpoint/2010/main" val="449716672"/>
       </p:ext>
     </p:extLst>
   </p:cSld>
@@ -6316,7 +6324,7 @@
           <a:p>
             <a:r>
               <a:rPr lang="en-US" dirty="0" smtClean="0"/>
-              <a:t>User Deals, Validate—Server Side Implementation</a:t>
+              <a:t>User Deals, Add—Server Side Implementation</a:t>
             </a:r>
             <a:endParaRPr lang="en-US" dirty="0"/>
           </a:p>
@@ -6344,7 +6352,7 @@
     </p:spTree>
     <p:extLst>
       <p:ext uri="{BB962C8B-B14F-4D97-AF65-F5344CB8AC3E}">
-        <p14:creationId xmlns:p14="http://schemas.microsoft.com/office/powerpoint/2010/main" val="1348877492"/>
+        <p14:creationId xmlns:p14="http://schemas.microsoft.com/office/powerpoint/2010/main" val="100306373"/>
       </p:ext>
     </p:extLst>
   </p:cSld>
@@ -6388,7 +6396,7 @@
           <a:p>
             <a:r>
               <a:rPr lang="en-US" dirty="0" smtClean="0"/>
-              <a:t>User Deals, Expire—Server Side Implementation</a:t>
+              <a:t>User Deals, Validate—Client Side Implementation</a:t>
             </a:r>
             <a:endParaRPr lang="en-US" dirty="0"/>
           </a:p>
@@ -6416,7 +6424,7 @@
     </p:spTree>
     <p:extLst>
       <p:ext uri="{BB962C8B-B14F-4D97-AF65-F5344CB8AC3E}">
-        <p14:creationId xmlns:p14="http://schemas.microsoft.com/office/powerpoint/2010/main" val="2455070259"/>
+        <p14:creationId xmlns:p14="http://schemas.microsoft.com/office/powerpoint/2010/main" val="2954434646"/>
       </p:ext>
     </p:extLst>
   </p:cSld>
@@ -6460,7 +6468,7 @@
           <a:p>
             <a:r>
               <a:rPr lang="en-US" dirty="0" smtClean="0"/>
-              <a:t>Functional Requirement--Database</a:t>
+              <a:t>User Deals, Validate—Server Side Implementation</a:t>
             </a:r>
             <a:endParaRPr lang="en-US" dirty="0"/>
           </a:p>
@@ -6481,22 +6489,14 @@
           <a:bodyPr/>
           <a:lstStyle/>
           <a:p>
-            <a:r>
-              <a:rPr lang="en-US" dirty="0"/>
-              <a:t>6. User information and user-created deals will be stored in a database. </a:t>
-            </a:r>
-            <a:r>
-              <a:rPr lang="en-US" i="1" dirty="0"/>
-              <a:t>(This is an essential feature ensuring that information is stored.)</a:t>
-            </a:r>
-            <a:endParaRPr lang="en-US" dirty="0"/>
+            <a:endParaRPr lang="en-US"/>
           </a:p>
         </p:txBody>
       </p:sp>
     </p:spTree>
     <p:extLst>
       <p:ext uri="{BB962C8B-B14F-4D97-AF65-F5344CB8AC3E}">
-        <p14:creationId xmlns:p14="http://schemas.microsoft.com/office/powerpoint/2010/main" val="2226419927"/>
+        <p14:creationId xmlns:p14="http://schemas.microsoft.com/office/powerpoint/2010/main" val="1348877492"/>
       </p:ext>
     </p:extLst>
   </p:cSld>
@@ -6540,7 +6540,7 @@
           <a:p>
             <a:r>
               <a:rPr lang="en-US" dirty="0" smtClean="0"/>
-              <a:t>Database, User Information—Client Side Implementation</a:t>
+              <a:t>User Deals, Expire—Server Side Implementation</a:t>
             </a:r>
             <a:endParaRPr lang="en-US" dirty="0"/>
           </a:p>
@@ -6568,7 +6568,7 @@
     </p:spTree>
     <p:extLst>
       <p:ext uri="{BB962C8B-B14F-4D97-AF65-F5344CB8AC3E}">
-        <p14:creationId xmlns:p14="http://schemas.microsoft.com/office/powerpoint/2010/main" val="2933004373"/>
+        <p14:creationId xmlns:p14="http://schemas.microsoft.com/office/powerpoint/2010/main" val="2455070259"/>
       </p:ext>
     </p:extLst>
   </p:cSld>
@@ -6612,7 +6612,7 @@
           <a:p>
             <a:r>
               <a:rPr lang="en-US" dirty="0" smtClean="0"/>
-              <a:t>Database, User Information—Server Side Implementation</a:t>
+              <a:t>Functional Requirement--Database</a:t>
             </a:r>
             <a:endParaRPr lang="en-US" dirty="0"/>
           </a:p>
@@ -6633,14 +6633,22 @@
           <a:bodyPr/>
           <a:lstStyle/>
           <a:p>
-            <a:endParaRPr lang="en-US"/>
+            <a:r>
+              <a:rPr lang="en-US" dirty="0"/>
+              <a:t>6. User information and user-created deals will be stored in a database. </a:t>
+            </a:r>
+            <a:r>
+              <a:rPr lang="en-US" i="1" dirty="0"/>
+              <a:t>(This is an essential feature ensuring that information is stored.)</a:t>
+            </a:r>
+            <a:endParaRPr lang="en-US" dirty="0"/>
           </a:p>
         </p:txBody>
       </p:sp>
     </p:spTree>
     <p:extLst>
       <p:ext uri="{BB962C8B-B14F-4D97-AF65-F5344CB8AC3E}">
-        <p14:creationId xmlns:p14="http://schemas.microsoft.com/office/powerpoint/2010/main" val="1253502696"/>
+        <p14:creationId xmlns:p14="http://schemas.microsoft.com/office/powerpoint/2010/main" val="2226419927"/>
       </p:ext>
     </p:extLst>
   </p:cSld>
@@ -6684,7 +6692,7 @@
           <a:p>
             <a:r>
               <a:rPr lang="en-US" dirty="0" smtClean="0"/>
-              <a:t>Functional Requirement—Shopping List</a:t>
+              <a:t>Non-Functional Requirement—Operating Systems</a:t>
             </a:r>
             <a:endParaRPr lang="en-US" dirty="0"/>
           </a:p>
@@ -6707,70 +6715,16 @@
           <a:p>
             <a:r>
               <a:rPr lang="en-US" dirty="0"/>
-              <a:t>1. Users will be able to manage their shopping list.  </a:t>
-            </a:r>
-            <a:r>
-              <a:rPr lang="en-US" i="1" dirty="0"/>
-              <a:t>(Managing their shopping list will include adding, editing, and removing items</a:t>
-            </a:r>
-            <a:r>
-              <a:rPr lang="en-US" i="1" dirty="0" smtClean="0"/>
-              <a:t>.)</a:t>
-            </a:r>
-            <a:endParaRPr lang="en-US" dirty="0"/>
-          </a:p>
-          <a:p>
-            <a:pPr lvl="1"/>
-            <a:r>
-              <a:rPr lang="en-US" dirty="0" smtClean="0"/>
-              <a:t>1A</a:t>
-            </a:r>
+              <a:t>6. Client application will use Java programming language on Android Operating System. </a:t>
+            </a:r>
+          </a:p>
+          <a:p>
             <a:r>
               <a:rPr lang="en-US" dirty="0"/>
-              <a:t>. Users will be able to add items to their shopping list.  (</a:t>
-            </a:r>
-            <a:r>
-              <a:rPr lang="en-US" i="1" dirty="0"/>
-              <a:t>Being able to add an item to the list is an essential feature</a:t>
-            </a:r>
-            <a:r>
-              <a:rPr lang="en-US" i="1" dirty="0" smtClean="0"/>
-              <a:t>.)</a:t>
-            </a:r>
-          </a:p>
-          <a:p>
-            <a:pPr lvl="1"/>
-            <a:r>
-              <a:rPr lang="en-US" dirty="0" smtClean="0"/>
-              <a:t>1B</a:t>
-            </a:r>
-            <a:r>
-              <a:rPr lang="en-US" dirty="0"/>
-              <a:t>. Users will be able to edit items in their shopping list.  </a:t>
-            </a:r>
-            <a:r>
-              <a:rPr lang="en-US" i="1" dirty="0"/>
-              <a:t>(The ability to edit an item is needed in case user enters inaccurate information</a:t>
-            </a:r>
-            <a:r>
-              <a:rPr lang="en-US" i="1" dirty="0" smtClean="0"/>
-              <a:t>.)</a:t>
-            </a:r>
-          </a:p>
-          <a:p>
-            <a:pPr lvl="1"/>
-            <a:r>
-              <a:rPr lang="en-US" dirty="0" smtClean="0"/>
-              <a:t>1C</a:t>
-            </a:r>
-            <a:r>
-              <a:rPr lang="en-US" dirty="0"/>
-              <a:t>. Users will be able to remove items from their shopping list.  </a:t>
-            </a:r>
-            <a:r>
-              <a:rPr lang="en-US" i="1" dirty="0"/>
-              <a:t>(The ability to remove an item is an essential feature.)</a:t>
-            </a:r>
+              <a:t>7. Server application will use JavaScript programming language with node.js on Linux Operating System. </a:t>
+            </a:r>
+          </a:p>
+          <a:p>
             <a:endParaRPr lang="en-US" dirty="0"/>
           </a:p>
         </p:txBody>
@@ -6778,7 +6732,7 @@
     </p:spTree>
     <p:extLst>
       <p:ext uri="{BB962C8B-B14F-4D97-AF65-F5344CB8AC3E}">
-        <p14:creationId xmlns:p14="http://schemas.microsoft.com/office/powerpoint/2010/main" val="1637306168"/>
+        <p14:creationId xmlns:p14="http://schemas.microsoft.com/office/powerpoint/2010/main" val="97703906"/>
       </p:ext>
     </p:extLst>
   </p:cSld>
@@ -6822,7 +6776,7 @@
           <a:p>
             <a:r>
               <a:rPr lang="en-US" dirty="0" smtClean="0"/>
-              <a:t>Database, User Deals—Client Side Implementation</a:t>
+              <a:t>Database, User Information—Client Side Implementation</a:t>
             </a:r>
             <a:endParaRPr lang="en-US" dirty="0"/>
           </a:p>
@@ -6850,7 +6804,7 @@
     </p:spTree>
     <p:extLst>
       <p:ext uri="{BB962C8B-B14F-4D97-AF65-F5344CB8AC3E}">
-        <p14:creationId xmlns:p14="http://schemas.microsoft.com/office/powerpoint/2010/main" val="4271439743"/>
+        <p14:creationId xmlns:p14="http://schemas.microsoft.com/office/powerpoint/2010/main" val="2933004373"/>
       </p:ext>
     </p:extLst>
   </p:cSld>
@@ -6894,7 +6848,7 @@
           <a:p>
             <a:r>
               <a:rPr lang="en-US" dirty="0" smtClean="0"/>
-              <a:t>Database, User Deals—Server Side Implementation</a:t>
+              <a:t>Database, User Information—Server Side Implementation</a:t>
             </a:r>
             <a:endParaRPr lang="en-US" dirty="0"/>
           </a:p>
@@ -6922,7 +6876,7 @@
     </p:spTree>
     <p:extLst>
       <p:ext uri="{BB962C8B-B14F-4D97-AF65-F5344CB8AC3E}">
-        <p14:creationId xmlns:p14="http://schemas.microsoft.com/office/powerpoint/2010/main" val="4270411433"/>
+        <p14:creationId xmlns:p14="http://schemas.microsoft.com/office/powerpoint/2010/main" val="1253502696"/>
       </p:ext>
     </p:extLst>
   </p:cSld>
@@ -6966,7 +6920,7 @@
           <a:p>
             <a:r>
               <a:rPr lang="en-US" dirty="0" smtClean="0"/>
-              <a:t>Functional Requirement—User Information</a:t>
+              <a:t>Database, User Deals—Client Side Implementation</a:t>
             </a:r>
             <a:endParaRPr lang="en-US" dirty="0"/>
           </a:p>
@@ -6987,22 +6941,14 @@
           <a:bodyPr/>
           <a:lstStyle/>
           <a:p>
-            <a:r>
-              <a:rPr lang="en-US" dirty="0"/>
-              <a:t>7. Users shall be uniquely identified by a user name.  </a:t>
-            </a:r>
-            <a:r>
-              <a:rPr lang="en-US" i="1" dirty="0"/>
-              <a:t>(This prevents duplicate user names from existing in the system.)</a:t>
-            </a:r>
-            <a:endParaRPr lang="en-US" dirty="0"/>
+            <a:endParaRPr lang="en-US"/>
           </a:p>
         </p:txBody>
       </p:sp>
     </p:spTree>
     <p:extLst>
       <p:ext uri="{BB962C8B-B14F-4D97-AF65-F5344CB8AC3E}">
-        <p14:creationId xmlns:p14="http://schemas.microsoft.com/office/powerpoint/2010/main" val="3350486513"/>
+        <p14:creationId xmlns:p14="http://schemas.microsoft.com/office/powerpoint/2010/main" val="4271439743"/>
       </p:ext>
     </p:extLst>
   </p:cSld>
@@ -7046,7 +6992,7 @@
           <a:p>
             <a:r>
               <a:rPr lang="en-US" dirty="0" smtClean="0"/>
-              <a:t>User Information—Client Side Implementation</a:t>
+              <a:t>Database, User Deals—Server Side Implementation</a:t>
             </a:r>
             <a:endParaRPr lang="en-US" dirty="0"/>
           </a:p>
@@ -7074,7 +7020,7 @@
     </p:spTree>
     <p:extLst>
       <p:ext uri="{BB962C8B-B14F-4D97-AF65-F5344CB8AC3E}">
-        <p14:creationId xmlns:p14="http://schemas.microsoft.com/office/powerpoint/2010/main" val="2525138655"/>
+        <p14:creationId xmlns:p14="http://schemas.microsoft.com/office/powerpoint/2010/main" val="4270411433"/>
       </p:ext>
     </p:extLst>
   </p:cSld>
@@ -7118,7 +7064,7 @@
           <a:p>
             <a:r>
               <a:rPr lang="en-US" dirty="0" smtClean="0"/>
-              <a:t>User Information—Server Side Implementation</a:t>
+              <a:t>Functional Requirement—User Information</a:t>
             </a:r>
             <a:endParaRPr lang="en-US" dirty="0"/>
           </a:p>
@@ -7139,14 +7085,22 @@
           <a:bodyPr/>
           <a:lstStyle/>
           <a:p>
-            <a:endParaRPr lang="en-US"/>
+            <a:r>
+              <a:rPr lang="en-US" dirty="0"/>
+              <a:t>7. Users shall be uniquely identified by a user name.  </a:t>
+            </a:r>
+            <a:r>
+              <a:rPr lang="en-US" i="1" dirty="0"/>
+              <a:t>(This prevents duplicate user names from existing in the system.)</a:t>
+            </a:r>
+            <a:endParaRPr lang="en-US" dirty="0"/>
           </a:p>
         </p:txBody>
       </p:sp>
     </p:spTree>
     <p:extLst>
       <p:ext uri="{BB962C8B-B14F-4D97-AF65-F5344CB8AC3E}">
-        <p14:creationId xmlns:p14="http://schemas.microsoft.com/office/powerpoint/2010/main" val="500561990"/>
+        <p14:creationId xmlns:p14="http://schemas.microsoft.com/office/powerpoint/2010/main" val="3350486513"/>
       </p:ext>
     </p:extLst>
   </p:cSld>
@@ -7190,7 +7144,7 @@
           <a:p>
             <a:r>
               <a:rPr lang="en-US" dirty="0" smtClean="0"/>
-              <a:t>Non-Functional Requirement—Operating Systems</a:t>
+              <a:t>User Information—Client Side Implementation</a:t>
             </a:r>
             <a:endParaRPr lang="en-US" dirty="0"/>
           </a:p>
@@ -7211,26 +7165,14 @@
           <a:bodyPr/>
           <a:lstStyle/>
           <a:p>
-            <a:r>
-              <a:rPr lang="en-US" dirty="0"/>
-              <a:t>6. Client application will use Java programming language on Android Operating System. </a:t>
-            </a:r>
-          </a:p>
-          <a:p>
-            <a:r>
-              <a:rPr lang="en-US" dirty="0"/>
-              <a:t>7. Server application will use JavaScript programming language with node.js on Linux Operating System. </a:t>
-            </a:r>
-          </a:p>
-          <a:p>
-            <a:endParaRPr lang="en-US" dirty="0"/>
+            <a:endParaRPr lang="en-US"/>
           </a:p>
         </p:txBody>
       </p:sp>
     </p:spTree>
     <p:extLst>
       <p:ext uri="{BB962C8B-B14F-4D97-AF65-F5344CB8AC3E}">
-        <p14:creationId xmlns:p14="http://schemas.microsoft.com/office/powerpoint/2010/main" val="3856037152"/>
+        <p14:creationId xmlns:p14="http://schemas.microsoft.com/office/powerpoint/2010/main" val="2525138655"/>
       </p:ext>
     </p:extLst>
   </p:cSld>
@@ -7274,11 +7216,7 @@
           <a:p>
             <a:r>
               <a:rPr lang="en-US" dirty="0" smtClean="0"/>
-              <a:t>Non-Functional Requirement—Server </a:t>
-            </a:r>
-            <a:r>
-              <a:rPr lang="en-US" dirty="0" err="1" smtClean="0"/>
-              <a:t>Datasource</a:t>
+              <a:t>User Information—Server Side Implementation</a:t>
             </a:r>
             <a:endParaRPr lang="en-US" dirty="0"/>
           </a:p>
@@ -7299,36 +7237,14 @@
           <a:bodyPr/>
           <a:lstStyle/>
           <a:p>
-            <a:r>
-              <a:rPr lang="en-US" dirty="0"/>
-              <a:t>8. Server application will use </a:t>
-            </a:r>
-            <a:r>
-              <a:rPr lang="en-US" dirty="0" err="1"/>
-              <a:t>mongodb</a:t>
-            </a:r>
-            <a:r>
-              <a:rPr lang="en-US" dirty="0"/>
-              <a:t> as </a:t>
-            </a:r>
-            <a:r>
-              <a:rPr lang="en-US" dirty="0" err="1"/>
-              <a:t>datasource</a:t>
-            </a:r>
-            <a:r>
-              <a:rPr lang="en-US" dirty="0"/>
-              <a:t>.</a:t>
-            </a:r>
-          </a:p>
-          <a:p>
-            <a:endParaRPr lang="en-US" dirty="0"/>
+            <a:endParaRPr lang="en-US"/>
           </a:p>
         </p:txBody>
       </p:sp>
     </p:spTree>
     <p:extLst>
       <p:ext uri="{BB962C8B-B14F-4D97-AF65-F5344CB8AC3E}">
-        <p14:creationId xmlns:p14="http://schemas.microsoft.com/office/powerpoint/2010/main" val="1370723192"/>
+        <p14:creationId xmlns:p14="http://schemas.microsoft.com/office/powerpoint/2010/main" val="500561990"/>
       </p:ext>
     </p:extLst>
   </p:cSld>
@@ -7444,7 +7360,11 @@
           <a:p>
             <a:r>
               <a:rPr lang="en-US" dirty="0" smtClean="0"/>
-              <a:t>Shopping List, Add—Client Side Implementation</a:t>
+              <a:t>Non-Functional Requirement—Server </a:t>
+            </a:r>
+            <a:r>
+              <a:rPr lang="en-US" dirty="0" err="1" smtClean="0"/>
+              <a:t>Datasource</a:t>
             </a:r>
             <a:endParaRPr lang="en-US" dirty="0"/>
           </a:p>
@@ -7465,14 +7385,36 @@
           <a:bodyPr/>
           <a:lstStyle/>
           <a:p>
-            <a:endParaRPr lang="en-US"/>
+            <a:r>
+              <a:rPr lang="en-US" dirty="0"/>
+              <a:t>8. Server application will use </a:t>
+            </a:r>
+            <a:r>
+              <a:rPr lang="en-US" dirty="0" err="1"/>
+              <a:t>mongodb</a:t>
+            </a:r>
+            <a:r>
+              <a:rPr lang="en-US" dirty="0"/>
+              <a:t> as </a:t>
+            </a:r>
+            <a:r>
+              <a:rPr lang="en-US" dirty="0" err="1"/>
+              <a:t>datasource</a:t>
+            </a:r>
+            <a:r>
+              <a:rPr lang="en-US" dirty="0"/>
+              <a:t>.</a:t>
+            </a:r>
+          </a:p>
+          <a:p>
+            <a:endParaRPr lang="en-US" dirty="0"/>
           </a:p>
         </p:txBody>
       </p:sp>
     </p:spTree>
     <p:extLst>
       <p:ext uri="{BB962C8B-B14F-4D97-AF65-F5344CB8AC3E}">
-        <p14:creationId xmlns:p14="http://schemas.microsoft.com/office/powerpoint/2010/main" val="1690294690"/>
+        <p14:creationId xmlns:p14="http://schemas.microsoft.com/office/powerpoint/2010/main" val="1806214989"/>
       </p:ext>
     </p:extLst>
   </p:cSld>
@@ -7516,7 +7458,7 @@
           <a:p>
             <a:r>
               <a:rPr lang="en-US" dirty="0" smtClean="0"/>
-              <a:t>Shopping List, Add—Server Side Implementation</a:t>
+              <a:t>Functional Requirement—Shopping List</a:t>
             </a:r>
             <a:endParaRPr lang="en-US" dirty="0"/>
           </a:p>
@@ -7537,14 +7479,80 @@
           <a:bodyPr/>
           <a:lstStyle/>
           <a:p>
-            <a:endParaRPr lang="en-US"/>
+            <a:r>
+              <a:rPr lang="en-US" dirty="0"/>
+              <a:t>1. Users will be able to manage their shopping list.  </a:t>
+            </a:r>
+            <a:r>
+              <a:rPr lang="en-US" i="1" dirty="0"/>
+              <a:t>(Managing their shopping list will include adding, editing, and removing items</a:t>
+            </a:r>
+            <a:r>
+              <a:rPr lang="en-US" i="1" dirty="0" smtClean="0"/>
+              <a:t>.)</a:t>
+            </a:r>
+            <a:endParaRPr lang="en-US" dirty="0"/>
+          </a:p>
+          <a:p>
+            <a:pPr lvl="1"/>
+            <a:r>
+              <a:rPr lang="en-US" dirty="0" smtClean="0"/>
+              <a:t>1A</a:t>
+            </a:r>
+            <a:r>
+              <a:rPr lang="en-US" dirty="0"/>
+              <a:t>. Users will be able to add items to their shopping list.  (</a:t>
+            </a:r>
+            <a:r>
+              <a:rPr lang="en-US" i="1" dirty="0"/>
+              <a:t>Being able to add an item to the list is an essential feature</a:t>
+            </a:r>
+            <a:r>
+              <a:rPr lang="en-US" i="1" dirty="0" smtClean="0"/>
+              <a:t>.)</a:t>
+            </a:r>
+          </a:p>
+          <a:p>
+            <a:pPr lvl="1"/>
+            <a:r>
+              <a:rPr lang="en-US" dirty="0" smtClean="0"/>
+              <a:t>1B</a:t>
+            </a:r>
+            <a:r>
+              <a:rPr lang="en-US" dirty="0"/>
+              <a:t>. Users will be able to edit items in their shopping list.  </a:t>
+            </a:r>
+            <a:r>
+              <a:rPr lang="en-US" i="1" dirty="0"/>
+              <a:t>(The ability to edit an item is needed in case user enters inaccurate information</a:t>
+            </a:r>
+            <a:r>
+              <a:rPr lang="en-US" i="1" dirty="0" smtClean="0"/>
+              <a:t>.)</a:t>
+            </a:r>
+          </a:p>
+          <a:p>
+            <a:pPr lvl="1"/>
+            <a:r>
+              <a:rPr lang="en-US" dirty="0" smtClean="0"/>
+              <a:t>1C</a:t>
+            </a:r>
+            <a:r>
+              <a:rPr lang="en-US" dirty="0"/>
+              <a:t>. Users will be able to remove items from their shopping list.  </a:t>
+            </a:r>
+            <a:r>
+              <a:rPr lang="en-US" i="1" dirty="0"/>
+              <a:t>(The ability to remove an item is an essential feature.)</a:t>
+            </a:r>
+            <a:endParaRPr lang="en-US" dirty="0"/>
           </a:p>
         </p:txBody>
       </p:sp>
     </p:spTree>
     <p:extLst>
       <p:ext uri="{BB962C8B-B14F-4D97-AF65-F5344CB8AC3E}">
-        <p14:creationId xmlns:p14="http://schemas.microsoft.com/office/powerpoint/2010/main" val="431295959"/>
+        <p14:creationId xmlns:p14="http://schemas.microsoft.com/office/powerpoint/2010/main" val="1637306168"/>
       </p:ext>
     </p:extLst>
   </p:cSld>
@@ -7588,7 +7596,7 @@
           <a:p>
             <a:r>
               <a:rPr lang="en-US" dirty="0" smtClean="0"/>
-              <a:t>Shopping List, Edit—Client Side Implementation</a:t>
+              <a:t>Shopping List, Add—Client Side Implementation</a:t>
             </a:r>
             <a:endParaRPr lang="en-US" dirty="0"/>
           </a:p>
@@ -7616,7 +7624,7 @@
     </p:spTree>
     <p:extLst>
       <p:ext uri="{BB962C8B-B14F-4D97-AF65-F5344CB8AC3E}">
-        <p14:creationId xmlns:p14="http://schemas.microsoft.com/office/powerpoint/2010/main" val="1454182423"/>
+        <p14:creationId xmlns:p14="http://schemas.microsoft.com/office/powerpoint/2010/main" val="1690294690"/>
       </p:ext>
     </p:extLst>
   </p:cSld>
@@ -7660,7 +7668,7 @@
           <a:p>
             <a:r>
               <a:rPr lang="en-US" dirty="0" smtClean="0"/>
-              <a:t>Shopping List, Edit—Server Side Implementation</a:t>
+              <a:t>Shopping List, Add—Server Side Implementation</a:t>
             </a:r>
             <a:endParaRPr lang="en-US" dirty="0"/>
           </a:p>
@@ -7688,7 +7696,7 @@
     </p:spTree>
     <p:extLst>
       <p:ext uri="{BB962C8B-B14F-4D97-AF65-F5344CB8AC3E}">
-        <p14:creationId xmlns:p14="http://schemas.microsoft.com/office/powerpoint/2010/main" val="1286831282"/>
+        <p14:creationId xmlns:p14="http://schemas.microsoft.com/office/powerpoint/2010/main" val="431295959"/>
       </p:ext>
     </p:extLst>
   </p:cSld>
@@ -7732,7 +7740,7 @@
           <a:p>
             <a:r>
               <a:rPr lang="en-US" dirty="0" smtClean="0"/>
-              <a:t>Shopping List, Remove—Client Side Implementation</a:t>
+              <a:t>Shopping List, Edit—Client Side Implementation</a:t>
             </a:r>
             <a:endParaRPr lang="en-US" dirty="0"/>
           </a:p>
@@ -7760,7 +7768,7 @@
     </p:spTree>
     <p:extLst>
       <p:ext uri="{BB962C8B-B14F-4D97-AF65-F5344CB8AC3E}">
-        <p14:creationId xmlns:p14="http://schemas.microsoft.com/office/powerpoint/2010/main" val="1743933881"/>
+        <p14:creationId xmlns:p14="http://schemas.microsoft.com/office/powerpoint/2010/main" val="1454182423"/>
       </p:ext>
     </p:extLst>
   </p:cSld>
@@ -7804,7 +7812,7 @@
           <a:p>
             <a:r>
               <a:rPr lang="en-US" dirty="0" smtClean="0"/>
-              <a:t>Shopping List, Remove—Server Side Implementation</a:t>
+              <a:t>Shopping List, Edit—Server Side Implementation</a:t>
             </a:r>
             <a:endParaRPr lang="en-US" dirty="0"/>
           </a:p>
@@ -7832,7 +7840,7 @@
     </p:spTree>
     <p:extLst>
       <p:ext uri="{BB962C8B-B14F-4D97-AF65-F5344CB8AC3E}">
-        <p14:creationId xmlns:p14="http://schemas.microsoft.com/office/powerpoint/2010/main" val="1923779810"/>
+        <p14:creationId xmlns:p14="http://schemas.microsoft.com/office/powerpoint/2010/main" val="1286831282"/>
       </p:ext>
     </p:extLst>
   </p:cSld>
@@ -7876,7 +7884,7 @@
           <a:p>
             <a:r>
               <a:rPr lang="en-US" dirty="0" smtClean="0"/>
-              <a:t>Functional Requirement—API Deals</a:t>
+              <a:t>Shopping List, Remove—Client Side Implementation</a:t>
             </a:r>
             <a:endParaRPr lang="en-US" dirty="0"/>
           </a:p>
@@ -7897,22 +7905,14 @@
           <a:bodyPr/>
           <a:lstStyle/>
           <a:p>
-            <a:r>
-              <a:rPr lang="en-US" dirty="0"/>
-              <a:t>2. Users will be able to search for sale prices at supported stores for an item in their shopping list. </a:t>
-            </a:r>
-            <a:r>
-              <a:rPr lang="en-US" i="1" dirty="0"/>
-              <a:t>(This will allow users to find prices for an item of interest.)</a:t>
-            </a:r>
-            <a:endParaRPr lang="en-US" dirty="0"/>
+            <a:endParaRPr lang="en-US"/>
           </a:p>
         </p:txBody>
       </p:sp>
     </p:spTree>
     <p:extLst>
       <p:ext uri="{BB962C8B-B14F-4D97-AF65-F5344CB8AC3E}">
-        <p14:creationId xmlns:p14="http://schemas.microsoft.com/office/powerpoint/2010/main" val="3396351313"/>
+        <p14:creationId xmlns:p14="http://schemas.microsoft.com/office/powerpoint/2010/main" val="1743933881"/>
       </p:ext>
     </p:extLst>
   </p:cSld>

</xml_diff>